<commit_message>
Updated graphs in the news
</commit_message>
<xml_diff>
--- a/data-viz-01/component/preparation.pptx
+++ b/data-viz-01/component/preparation.pptx
@@ -1250,156 +1250,6 @@
             <a:r>
               <a:rPr/>
               <a:t>quickly.</a:t>
-            </a:r>
-          </a:p>
-          <a:p>
-            <a:pPr lvl="0" marL="0" indent="0">
-              <a:buNone/>
-            </a:pPr>
-          </a:p>
-          <a:p>
-            <a:pPr lvl="0" marL="0" indent="0">
-              <a:buNone/>
-            </a:pPr>
-            <a:r>
-              <a:rPr/>
-              <a:t>Note</a:t>
-            </a:r>
-            <a:r>
-              <a:rPr/>
-              <a:t> </a:t>
-            </a:r>
-            <a:r>
-              <a:rPr/>
-              <a:t>to</a:t>
-            </a:r>
-            <a:r>
-              <a:rPr/>
-              <a:t> </a:t>
-            </a:r>
-            <a:r>
-              <a:rPr/>
-              <a:t>myself:</a:t>
-            </a:r>
-            <a:r>
-              <a:rPr/>
-              <a:t> </a:t>
-            </a:r>
-            <a:r>
-              <a:rPr/>
-              <a:t>Try</a:t>
-            </a:r>
-            <a:r>
-              <a:rPr/>
-              <a:t> </a:t>
-            </a:r>
-            <a:r>
-              <a:rPr/>
-              <a:t>to</a:t>
-            </a:r>
-            <a:r>
-              <a:rPr/>
-              <a:t> </a:t>
-            </a:r>
-            <a:r>
-              <a:rPr/>
-              <a:t>keep</a:t>
-            </a:r>
-            <a:r>
-              <a:rPr/>
-              <a:t> </a:t>
-            </a:r>
-            <a:r>
-              <a:rPr/>
-              <a:t>this</a:t>
-            </a:r>
-            <a:r>
-              <a:rPr/>
-              <a:t> </a:t>
-            </a:r>
-            <a:r>
-              <a:rPr/>
-              <a:t>and</a:t>
-            </a:r>
-            <a:r>
-              <a:rPr/>
-              <a:t> </a:t>
-            </a:r>
-            <a:r>
-              <a:rPr/>
-              <a:t>every</a:t>
-            </a:r>
-            <a:r>
-              <a:rPr/>
-              <a:t> </a:t>
-            </a:r>
-            <a:r>
-              <a:rPr/>
-              <a:t>other</a:t>
-            </a:r>
-            <a:r>
-              <a:rPr/>
-              <a:t> </a:t>
-            </a:r>
-            <a:r>
-              <a:rPr/>
-              <a:t>image</a:t>
-            </a:r>
-            <a:r>
-              <a:rPr/>
-              <a:t> </a:t>
-            </a:r>
-            <a:r>
-              <a:rPr/>
-              <a:t>to</a:t>
-            </a:r>
-            <a:r>
-              <a:rPr/>
-              <a:t> </a:t>
-            </a:r>
-            <a:r>
-              <a:rPr/>
-              <a:t>no</a:t>
-            </a:r>
-            <a:r>
-              <a:rPr/>
-              <a:t> </a:t>
-            </a:r>
-            <a:r>
-              <a:rPr/>
-              <a:t>greater</a:t>
-            </a:r>
-            <a:r>
-              <a:rPr/>
-              <a:t> </a:t>
-            </a:r>
-            <a:r>
-              <a:rPr/>
-              <a:t>than</a:t>
-            </a:r>
-            <a:r>
-              <a:rPr/>
-              <a:t> </a:t>
-            </a:r>
-            <a:r>
-              <a:rPr/>
-              <a:t>800</a:t>
-            </a:r>
-            <a:r>
-              <a:rPr/>
-              <a:t> </a:t>
-            </a:r>
-            <a:r>
-              <a:rPr/>
-              <a:t>by</a:t>
-            </a:r>
-            <a:r>
-              <a:rPr/>
-              <a:t> </a:t>
-            </a:r>
-            <a:r>
-              <a:rPr/>
-              <a:t>480.</a:t>
             </a:r>
           </a:p>
         </p:txBody>
@@ -10841,7 +10691,7 @@
             </a:pPr>
             <a:r>
               <a:rPr/>
-              <a:t>V01,</a:t>
+              <a:t>Scatterplots,</a:t>
             </a:r>
             <a:r>
               <a:rPr/>
@@ -10890,6 +10740,39 @@
             <a:r>
               <a:rPr/>
               <a:t>Simon</a:t>
+            </a:r>
+          </a:p>
+        </p:txBody>
+      </p:sp>
+      <p:sp>
+        <p:nvSpPr>
+          <p:cNvPr id="4" name="Date Placeholder 3"/>
+          <p:cNvSpPr>
+            <a:spLocks noGrp="1"/>
+          </p:cNvSpPr>
+          <p:nvPr>
+            <p:ph type="dt" sz="half" idx="10"/>
+          </p:nvPr>
+        </p:nvSpPr>
+        <p:spPr/>
+        <p:txBody>
+          <a:bodyPr/>
+          <a:lstStyle/>
+          <a:p>
+            <a:pPr lvl="0" marL="0" indent="0">
+              <a:buNone/>
+            </a:pPr>
+            <a:r>
+              <a:rPr/>
+              <a:t>Created</a:t>
+            </a:r>
+            <a:r>
+              <a:rPr/>
+              <a:t> </a:t>
+            </a:r>
+            <a:r>
+              <a:rPr/>
+              <a:t>2019-08-16</a:t>
             </a:r>
           </a:p>
         </p:txBody>
@@ -10936,23 +10819,39 @@
             </a:pPr>
             <a:r>
               <a:rPr/>
-              <a:t>Importing</a:t>
-            </a:r>
-            <a:r>
-              <a:rPr/>
-              <a:t> </a:t>
-            </a:r>
-            <a:r>
-              <a:rPr/>
-              <a:t>into</a:t>
-            </a:r>
-            <a:r>
-              <a:rPr/>
-              <a:t> </a:t>
-            </a:r>
-            <a:r>
-              <a:rPr/>
-              <a:t>Tableau</a:t>
+              <a:t>Preparation,</a:t>
+            </a:r>
+            <a:r>
+              <a:rPr/>
+              <a:t> </a:t>
+            </a:r>
+            <a:r>
+              <a:rPr/>
+              <a:t>Tableau,</a:t>
+            </a:r>
+            <a:r>
+              <a:rPr/>
+              <a:t> </a:t>
+            </a:r>
+            <a:r>
+              <a:rPr/>
+              <a:t>Select</a:t>
+            </a:r>
+            <a:r>
+              <a:rPr/>
+              <a:t> </a:t>
+            </a:r>
+            <a:r>
+              <a:rPr/>
+              <a:t>your</a:t>
+            </a:r>
+            <a:r>
+              <a:rPr/>
+              <a:t> </a:t>
+            </a:r>
+            <a:r>
+              <a:rPr/>
+              <a:t>file</a:t>
             </a:r>
           </a:p>
         </p:txBody>
@@ -11115,23 +11014,31 @@
             </a:pPr>
             <a:r>
               <a:rPr/>
-              <a:t>Importing</a:t>
-            </a:r>
-            <a:r>
-              <a:rPr/>
-              <a:t> </a:t>
-            </a:r>
-            <a:r>
-              <a:rPr/>
-              <a:t>into</a:t>
-            </a:r>
-            <a:r>
-              <a:rPr/>
-              <a:t> </a:t>
-            </a:r>
-            <a:r>
-              <a:rPr/>
-              <a:t>Tableau</a:t>
+              <a:t>Preparation,</a:t>
+            </a:r>
+            <a:r>
+              <a:rPr/>
+              <a:t> </a:t>
+            </a:r>
+            <a:r>
+              <a:rPr/>
+              <a:t>Tabelau</a:t>
+            </a:r>
+            <a:r>
+              <a:rPr/>
+              <a:t> </a:t>
+            </a:r>
+            <a:r>
+              <a:rPr/>
+              <a:t>data</a:t>
+            </a:r>
+            <a:r>
+              <a:rPr/>
+              <a:t> </a:t>
+            </a:r>
+            <a:r>
+              <a:rPr/>
+              <a:t>preview</a:t>
             </a:r>
           </a:p>
         </p:txBody>
@@ -11286,23 +11193,31 @@
             </a:pPr>
             <a:r>
               <a:rPr/>
-              <a:t>Importing</a:t>
-            </a:r>
-            <a:r>
-              <a:rPr/>
-              <a:t> </a:t>
-            </a:r>
-            <a:r>
-              <a:rPr/>
-              <a:t>into</a:t>
-            </a:r>
-            <a:r>
-              <a:rPr/>
-              <a:t> </a:t>
-            </a:r>
-            <a:r>
-              <a:rPr/>
-              <a:t>Tableau</a:t>
+              <a:t>Preparation,</a:t>
+            </a:r>
+            <a:r>
+              <a:rPr/>
+              <a:t> </a:t>
+            </a:r>
+            <a:r>
+              <a:rPr/>
+              <a:t>Tableau,</a:t>
+            </a:r>
+            <a:r>
+              <a:rPr/>
+              <a:t> </a:t>
+            </a:r>
+            <a:r>
+              <a:rPr/>
+              <a:t>start</a:t>
+            </a:r>
+            <a:r>
+              <a:rPr/>
+              <a:t> </a:t>
+            </a:r>
+            <a:r>
+              <a:rPr/>
+              <a:t>visualization</a:t>
             </a:r>
           </a:p>
         </p:txBody>
@@ -11457,23 +11372,47 @@
             </a:pPr>
             <a:r>
               <a:rPr/>
-              <a:t>Importing</a:t>
-            </a:r>
-            <a:r>
-              <a:rPr/>
-              <a:t> </a:t>
-            </a:r>
-            <a:r>
-              <a:rPr/>
-              <a:t>into</a:t>
-            </a:r>
-            <a:r>
-              <a:rPr/>
-              <a:t> </a:t>
-            </a:r>
-            <a:r>
-              <a:rPr/>
-              <a:t>Tableau</a:t>
+              <a:t>Preparation,</a:t>
+            </a:r>
+            <a:r>
+              <a:rPr/>
+              <a:t> </a:t>
+            </a:r>
+            <a:r>
+              <a:rPr/>
+              <a:t>Tableau,</a:t>
+            </a:r>
+            <a:r>
+              <a:rPr/>
+              <a:t> </a:t>
+            </a:r>
+            <a:r>
+              <a:rPr/>
+              <a:t>Identify</a:t>
+            </a:r>
+            <a:r>
+              <a:rPr/>
+              <a:t> </a:t>
+            </a:r>
+            <a:r>
+              <a:rPr/>
+              <a:t>columns</a:t>
+            </a:r>
+            <a:r>
+              <a:rPr/>
+              <a:t> </a:t>
+            </a:r>
+            <a:r>
+              <a:rPr/>
+              <a:t>and</a:t>
+            </a:r>
+            <a:r>
+              <a:rPr/>
+              <a:t> </a:t>
+            </a:r>
+            <a:r>
+              <a:rPr/>
+              <a:t>rows</a:t>
             </a:r>
           </a:p>
         </p:txBody>
@@ -11644,23 +11583,31 @@
             </a:pPr>
             <a:r>
               <a:rPr/>
-              <a:t>Importing</a:t>
-            </a:r>
-            <a:r>
-              <a:rPr/>
-              <a:t> </a:t>
-            </a:r>
-            <a:r>
-              <a:rPr/>
-              <a:t>into</a:t>
-            </a:r>
-            <a:r>
-              <a:rPr/>
-              <a:t> </a:t>
-            </a:r>
-            <a:r>
-              <a:rPr/>
-              <a:t>Tableau</a:t>
+              <a:t>Preparation,</a:t>
+            </a:r>
+            <a:r>
+              <a:rPr/>
+              <a:t> </a:t>
+            </a:r>
+            <a:r>
+              <a:rPr/>
+              <a:t>Tableau,</a:t>
+            </a:r>
+            <a:r>
+              <a:rPr/>
+              <a:t> </a:t>
+            </a:r>
+            <a:r>
+              <a:rPr/>
+              <a:t>change</a:t>
+            </a:r>
+            <a:r>
+              <a:rPr/>
+              <a:t> </a:t>
+            </a:r>
+            <a:r>
+              <a:rPr/>
+              <a:t>columns</a:t>
             </a:r>
           </a:p>
         </p:txBody>
@@ -11831,23 +11778,63 @@
             </a:pPr>
             <a:r>
               <a:rPr/>
-              <a:t>Importing</a:t>
-            </a:r>
-            <a:r>
-              <a:rPr/>
-              <a:t> </a:t>
-            </a:r>
-            <a:r>
-              <a:rPr/>
-              <a:t>into</a:t>
-            </a:r>
-            <a:r>
-              <a:rPr/>
-              <a:t> </a:t>
-            </a:r>
-            <a:r>
-              <a:rPr/>
-              <a:t>Tableau</a:t>
+              <a:t>Preparation,</a:t>
+            </a:r>
+            <a:r>
+              <a:rPr/>
+              <a:t> </a:t>
+            </a:r>
+            <a:r>
+              <a:rPr/>
+              <a:t>Tableau,</a:t>
+            </a:r>
+            <a:r>
+              <a:rPr/>
+              <a:t> </a:t>
+            </a:r>
+            <a:r>
+              <a:rPr/>
+              <a:t>what</a:t>
+            </a:r>
+            <a:r>
+              <a:rPr/>
+              <a:t> </a:t>
+            </a:r>
+            <a:r>
+              <a:rPr/>
+              <a:t>your</a:t>
+            </a:r>
+            <a:r>
+              <a:rPr/>
+              <a:t> </a:t>
+            </a:r>
+            <a:r>
+              <a:rPr/>
+              <a:t>graph</a:t>
+            </a:r>
+            <a:r>
+              <a:rPr/>
+              <a:t> </a:t>
+            </a:r>
+            <a:r>
+              <a:rPr/>
+              <a:t>should</a:t>
+            </a:r>
+            <a:r>
+              <a:rPr/>
+              <a:t> </a:t>
+            </a:r>
+            <a:r>
+              <a:rPr/>
+              <a:t>look</a:t>
+            </a:r>
+            <a:r>
+              <a:rPr/>
+              <a:t> </a:t>
+            </a:r>
+            <a:r>
+              <a:rPr/>
+              <a:t>like</a:t>
             </a:r>
           </a:p>
         </p:txBody>
@@ -12018,6 +12005,14 @@
             </a:pPr>
             <a:r>
               <a:rPr/>
+              <a:t>Preparation,</a:t>
+            </a:r>
+            <a:r>
+              <a:rPr/>
+              <a:t> </a:t>
+            </a:r>
+            <a:r>
+              <a:rPr/>
               <a:t>DASL</a:t>
             </a:r>
             <a:r>
@@ -12167,15 +12162,11 @@
             </a:pPr>
             <a:r>
               <a:rPr/>
-              <a:t>Choose</a:t>
-            </a:r>
-            <a:r>
-              <a:rPr/>
-              <a:t> </a:t>
-            </a:r>
-            <a:r>
-              <a:rPr/>
-              <a:t>“</a:t>
+              <a:t>Preparation,</a:t>
+            </a:r>
+            <a:r>
+              <a:rPr/>
+              <a:t> </a:t>
             </a:r>
             <a:r>
               <a:rPr/>
@@ -12196,46 +12187,6 @@
             <a:r>
               <a:rPr/>
               <a:t>Prices</a:t>
-            </a:r>
-            <a:r>
-              <a:rPr/>
-              <a:t>”</a:t>
-            </a:r>
-            <a:r>
-              <a:rPr/>
-              <a:t> </a:t>
-            </a:r>
-            <a:r>
-              <a:rPr/>
-              <a:t>(not</a:t>
-            </a:r>
-            <a:r>
-              <a:rPr/>
-              <a:t> </a:t>
-            </a:r>
-            <a:r>
-              <a:rPr/>
-              <a:t>“</a:t>
-            </a:r>
-            <a:r>
-              <a:rPr/>
-              <a:t>Saratoga</a:t>
-            </a:r>
-            <a:r>
-              <a:rPr/>
-              <a:t> </a:t>
-            </a:r>
-            <a:r>
-              <a:rPr/>
-              <a:t>Houses</a:t>
-            </a:r>
-            <a:r>
-              <a:rPr/>
-              <a:t>”</a:t>
-            </a:r>
-            <a:r>
-              <a:rPr/>
-              <a:t>)</a:t>
             </a:r>
           </a:p>
         </p:txBody>
@@ -12390,23 +12341,15 @@
             </a:pPr>
             <a:r>
               <a:rPr/>
-              <a:t>Some</a:t>
-            </a:r>
-            <a:r>
-              <a:rPr/>
-              <a:t> </a:t>
-            </a:r>
-            <a:r>
-              <a:rPr/>
-              <a:t>general</a:t>
-            </a:r>
-            <a:r>
-              <a:rPr/>
-              <a:t> </a:t>
-            </a:r>
-            <a:r>
-              <a:rPr/>
-              <a:t>advice</a:t>
+              <a:t>Preparation,</a:t>
+            </a:r>
+            <a:r>
+              <a:rPr/>
+              <a:t> </a:t>
+            </a:r>
+            <a:r>
+              <a:rPr/>
+              <a:t>Advice</a:t>
             </a:r>
             <a:r>
               <a:rPr/>
@@ -12550,6 +12493,14 @@
             </a:pPr>
             <a:r>
               <a:rPr/>
+              <a:t>Preparation,</a:t>
+            </a:r>
+            <a:r>
+              <a:rPr/>
+              <a:t> </a:t>
+            </a:r>
+            <a:r>
+              <a:rPr/>
               <a:t>Python</a:t>
             </a:r>
             <a:r>
@@ -12638,6 +12589,14 @@
             <a:pPr lvl="0" marL="0" indent="0">
               <a:buNone/>
             </a:pPr>
+            <a:r>
+              <a:rPr/>
+              <a:t>Preparation,</a:t>
+            </a:r>
+            <a:r>
+              <a:rPr/>
+              <a:t> </a:t>
+            </a:r>
             <a:r>
               <a:rPr/>
               <a:t>Python</a:t>
@@ -12779,6 +12738,14 @@
             </a:pPr>
             <a:r>
               <a:rPr/>
+              <a:t>Preparation,</a:t>
+            </a:r>
+            <a:r>
+              <a:rPr/>
+              <a:t> </a:t>
+            </a:r>
+            <a:r>
+              <a:rPr/>
               <a:t>R</a:t>
             </a:r>
             <a:r>
@@ -12874,6 +12841,14 @@
             </a:pPr>
             <a:r>
               <a:rPr/>
+              <a:t>Preparation,</a:t>
+            </a:r>
+            <a:r>
+              <a:rPr/>
+              <a:t> </a:t>
+            </a:r>
+            <a:r>
+              <a:rPr/>
               <a:t>What</a:t>
             </a:r>
             <a:r>
@@ -12951,8 +12926,8 @@
         </p:blipFill>
         <p:spPr bwMode="auto">
           <a:xfrm>
-            <a:off x="2565400" y="1600200"/>
-            <a:ext cx="4013200" cy="4013200"/>
+            <a:off x="2311400" y="1600200"/>
+            <a:ext cx="4521200" cy="4521200"/>
           </a:xfrm>
           <a:prstGeom prst="rect">
             <a:avLst/>
@@ -12965,44 +12940,6 @@
           </a:ln>
         </p:spPr>
       </p:pic>
-      <p:sp>
-        <p:nvSpPr>
-          <p:cNvPr id="1" name="TextBox 3"/>
-          <p:cNvSpPr txBox="1"/>
-          <p:nvPr/>
-        </p:nvSpPr>
-        <p:spPr>
-          <a:xfrm>
-            <a:off x="457200" y="5613400"/>
-            <a:ext cx="8229600" cy="508000"/>
-          </a:xfrm>
-          <a:prstGeom prst="rect">
-            <a:avLst/>
-          </a:prstGeom>
-          <a:noFill/>
-        </p:spPr>
-        <p:txBody>
-          <a:bodyPr/>
-          <a:lstStyle/>
-          <a:p>
-            <a:pPr lvl="0" marL="0" indent="0" algn="ctr">
-              <a:buNone/>
-            </a:pPr>
-            <a:r>
-              <a:rPr/>
-              <a:t>Basic</a:t>
-            </a:r>
-            <a:r>
-              <a:rPr/>
-              <a:t> </a:t>
-            </a:r>
-            <a:r>
-              <a:rPr/>
-              <a:t>scatterplot</a:t>
-            </a:r>
-          </a:p>
-        </p:txBody>
-      </p:sp>
     </p:spTree>
   </p:cSld>
 </p:sld>
@@ -13045,15 +12982,7 @@
             </a:pPr>
             <a:r>
               <a:rPr/>
-              <a:t>Importing</a:t>
-            </a:r>
-            <a:r>
-              <a:rPr/>
-              <a:t> </a:t>
-            </a:r>
-            <a:r>
-              <a:rPr/>
-              <a:t>into</a:t>
+              <a:t>Preparation,</a:t>
             </a:r>
             <a:r>
               <a:rPr/>
@@ -13062,6 +12991,30 @@
             <a:r>
               <a:rPr/>
               <a:t>Tableau</a:t>
+            </a:r>
+            <a:r>
+              <a:rPr/>
+              <a:t> </a:t>
+            </a:r>
+            <a:r>
+              <a:rPr/>
+              <a:t>Open</a:t>
+            </a:r>
+            <a:r>
+              <a:rPr/>
+              <a:t> </a:t>
+            </a:r>
+            <a:r>
+              <a:rPr/>
+              <a:t>dialog</a:t>
+            </a:r>
+            <a:r>
+              <a:rPr/>
+              <a:t> </a:t>
+            </a:r>
+            <a:r>
+              <a:rPr/>
+              <a:t>box</a:t>
             </a:r>
           </a:p>
         </p:txBody>

</xml_diff>

<commit_message>
Added Python and Tableau to data-viz-03 fundamentals
</commit_message>
<xml_diff>
--- a/data-viz-01/component/preparation.pptx
+++ b/data-viz-01/component/preparation.pptx
@@ -5437,6 +5437,20 @@
         <p:txBody>
           <a:bodyPr/>
           <a:lstStyle/>
+          <a:p>
+            <a:pPr lvl="0" marL="0" indent="0">
+              <a:buNone/>
+            </a:pPr>
+            <a:r>
+              <a:rPr/>
+              <a:t>http://localhost:8888/?token=defbcdfe24454796470962f1cae834a7c7c8ec78d2c9075f</a:t>
+            </a:r>
+          </a:p>
+          <a:p>
+            <a:pPr lvl="0" marL="0" indent="0">
+              <a:buNone/>
+            </a:pPr>
+          </a:p>
           <a:p>
             <a:pPr lvl="0" marL="0" indent="0">
               <a:buNone/>
@@ -12510,41 +12524,6 @@
             <a:r>
               <a:rPr/>
               <a:t>code</a:t>
-            </a:r>
-          </a:p>
-        </p:txBody>
-      </p:sp>
-      <p:sp>
-        <p:nvSpPr>
-          <p:cNvPr id="3" name="Content Placeholder 2"/>
-          <p:cNvSpPr>
-            <a:spLocks noGrp="1"/>
-          </p:cNvSpPr>
-          <p:nvPr>
-            <p:ph idx="1"/>
-          </p:nvPr>
-        </p:nvSpPr>
-        <p:spPr/>
-        <p:txBody>
-          <a:bodyPr/>
-          <a:lstStyle/>
-          <a:p>
-            <a:pPr lvl="0" marL="1270000" indent="0">
-              <a:buNone/>
-            </a:pPr>
-            <a:r>
-              <a:rPr sz="1800">
-                <a:latin typeface="Courier"/>
-              </a:rPr>
-              <a:t>http://localhost:8888/?token=defbcdfe24454796470962f1cae834a7c7c8ec78d2c9075f
-import pandas as pd
-import altair as alt
-df = pd.read_csv("data-viz-01/data/saratoga-house-prices.csv")
-ch = alt.Chart(df).mark_point().encode(
-    x='Age',
-    y='Price'
-)
-ch.save("basic-scatterplot.html")</a:t>
             </a:r>
           </a:p>
         </p:txBody>

</xml_diff>